<commit_message>
Implications to book launch slides
</commit_message>
<xml_diff>
--- a/Book_launch/Book_launch_MCD_v2.pptx
+++ b/Book_launch/Book_launch_MCD_v2.pptx
@@ -21,8 +21,11 @@
     <p:sldId id="269" r:id="rId15"/>
     <p:sldId id="270" r:id="rId16"/>
     <p:sldId id="271" r:id="rId17"/>
-    <p:sldId id="273" r:id="rId18"/>
-    <p:sldId id="274" r:id="rId19"/>
+    <p:sldId id="275" r:id="rId18"/>
+    <p:sldId id="276" r:id="rId19"/>
+    <p:sldId id="277" r:id="rId20"/>
+    <p:sldId id="273" r:id="rId21"/>
+    <p:sldId id="274" r:id="rId22"/>
   </p:sldIdLst>
   <p:sldSz cx="9144000" cy="5715000" type="screen16x10"/>
   <p:notesSz cx="6858000" cy="9144000"/>
@@ -3773,7 +3776,7 @@
           <a:p>
             <a:r>
               <a:rPr lang="en-US" dirty="0" smtClean="0"/>
-              <a:t>Implications</a:t>
+              <a:t>What does all this mean?</a:t>
             </a:r>
             <a:endParaRPr lang="en-US" dirty="0"/>
           </a:p>
@@ -3796,13 +3799,21 @@
           <a:p>
             <a:r>
               <a:rPr lang="en-US" dirty="0" smtClean="0"/>
-              <a:t>Implications for economic growth and development</a:t>
-            </a:r>
-          </a:p>
-          <a:p>
+              <a:t>Implications:</a:t>
+            </a:r>
+          </a:p>
+          <a:p>
+            <a:pPr lvl="1"/>
             <a:r>
               <a:rPr lang="en-US" dirty="0" smtClean="0"/>
-              <a:t>Implications for reuse, recycling, and dematerialization</a:t>
+              <a:t>for economic growth and development</a:t>
+            </a:r>
+          </a:p>
+          <a:p>
+            <a:pPr lvl="1"/>
+            <a:r>
+              <a:rPr lang="en-US" dirty="0" smtClean="0"/>
+              <a:t>for reuse, recycling, and dematerialization</a:t>
             </a:r>
           </a:p>
           <a:p>
@@ -3861,7 +3872,7 @@
           <a:p>
             <a:r>
               <a:rPr lang="en-US" dirty="0" smtClean="0"/>
-              <a:t>Next steps</a:t>
+              <a:t>Implications for economic growth </a:t>
             </a:r>
             <a:endParaRPr lang="en-US" dirty="0"/>
           </a:p>
@@ -3879,126 +3890,54 @@
         </p:nvSpPr>
         <p:spPr/>
         <p:txBody>
-          <a:bodyPr>
-            <a:normAutofit fontScale="77500" lnSpcReduction="20000"/>
-          </a:bodyPr>
-          <a:lstStyle/>
-          <a:p>
-            <a:pPr marL="514350" indent="-514350">
-              <a:buFont typeface="+mj-lt"/>
-              <a:buAutoNum type="arabicPeriod"/>
-            </a:pPr>
+          <a:bodyPr/>
+          <a:lstStyle/>
+          <a:p>
+            <a:r>
+              <a:rPr lang="en-US" dirty="0"/>
+              <a:t> Across the world, economic health </a:t>
+            </a:r>
             <a:r>
               <a:rPr lang="en-US" dirty="0" smtClean="0"/>
-              <a:t>Data </a:t>
+              <a:t>is </a:t>
             </a:r>
             <a:r>
               <a:rPr lang="en-US" dirty="0"/>
-              <a:t>on stocks and inter-sector flows should be reported by a single, </a:t>
+              <a:t>measured almost </a:t>
             </a:r>
             <a:r>
               <a:rPr lang="en-US" dirty="0" smtClean="0"/>
-              <a:t>centralized agency.</a:t>
-            </a:r>
-          </a:p>
-          <a:p>
-            <a:pPr marL="514350" indent="-514350">
-              <a:buFont typeface="+mj-lt"/>
-              <a:buAutoNum type="arabicPeriod"/>
-            </a:pPr>
+              <a:t>exclusively by GDP. </a:t>
+            </a:r>
+          </a:p>
+          <a:p>
+            <a:pPr lvl="1"/>
             <a:r>
               <a:rPr lang="en-US" dirty="0" smtClean="0"/>
-              <a:t>National accounts should</a:t>
-            </a:r>
-          </a:p>
-          <a:p>
-            <a:pPr marL="914400" lvl="1" indent="-514350">
-              <a:buFont typeface="+mj-lt"/>
-              <a:buAutoNum type="alphaLcPeriod"/>
-            </a:pPr>
-            <a:r>
-              <a:rPr lang="en-US" dirty="0" smtClean="0"/>
-              <a:t>include non-market exchanges</a:t>
-            </a:r>
-          </a:p>
-          <a:p>
-            <a:pPr marL="914400" lvl="1" indent="-514350">
-              <a:buFont typeface="+mj-lt"/>
-              <a:buAutoNum type="alphaLcPeriod"/>
-            </a:pPr>
-            <a:r>
-              <a:rPr lang="en-US" dirty="0" smtClean="0"/>
-              <a:t>maintain balance sheets for both natural and manufactured capital</a:t>
-            </a:r>
-          </a:p>
-          <a:p>
-            <a:pPr marL="914400" lvl="1" indent="-514350">
-              <a:buFont typeface="+mj-lt"/>
-              <a:buAutoNum type="alphaLcPeriod"/>
-            </a:pPr>
-            <a:r>
-              <a:rPr lang="en-US" dirty="0" smtClean="0"/>
-              <a:t>provide </a:t>
+              <a:t>If </a:t>
             </a:r>
             <a:r>
               <a:rPr lang="en-US" dirty="0"/>
-              <a:t>additional </a:t>
-            </a:r>
-            <a:r>
-              <a:rPr lang="en-US" dirty="0" smtClean="0"/>
-              <a:t>disaggregated values for </a:t>
-            </a:r>
-            <a:r>
-              <a:rPr lang="en-US" dirty="0"/>
-              <a:t>waste </a:t>
-            </a:r>
-            <a:r>
-              <a:rPr lang="en-US" dirty="0" smtClean="0"/>
-              <a:t>flows in physical units</a:t>
-            </a:r>
-          </a:p>
-          <a:p>
-            <a:pPr marL="914400" lvl="1" indent="-514350">
-              <a:buFont typeface="+mj-lt"/>
-              <a:buAutoNum type="alphaLcPeriod"/>
-            </a:pPr>
-            <a:r>
-              <a:rPr lang="en-US" dirty="0" smtClean="0"/>
-              <a:t>routinely </a:t>
-            </a:r>
-            <a:r>
-              <a:rPr lang="en-US" dirty="0"/>
-              <a:t>estimate the energy </a:t>
-            </a:r>
-            <a:r>
-              <a:rPr lang="en-US" dirty="0" smtClean="0"/>
-              <a:t>intensity of </a:t>
-            </a:r>
-            <a:r>
-              <a:rPr lang="en-US" dirty="0"/>
-              <a:t>economic products using a physical accounting </a:t>
-            </a:r>
-            <a:r>
-              <a:rPr lang="en-US" dirty="0" smtClean="0"/>
-              <a:t>framework</a:t>
-            </a:r>
-          </a:p>
-          <a:p>
-            <a:pPr marL="914400" lvl="1" indent="-514350">
-              <a:buFont typeface="+mj-lt"/>
-              <a:buAutoNum type="alphaLcPeriod"/>
-            </a:pPr>
-            <a:r>
-              <a:rPr lang="en-US" dirty="0" smtClean="0"/>
-              <a:t>be estimated and disseminated on an annual basis</a:t>
-            </a:r>
+              <a:t>GDP grows, the economy is said to </a:t>
+            </a:r>
+            <a:r>
+              <a:rPr lang="en-US"/>
+              <a:t>be </a:t>
+            </a:r>
+            <a:r>
+              <a:rPr lang="en-US" smtClean="0"/>
+              <a:t>growing</a:t>
+            </a:r>
+          </a:p>
+          <a:p>
+            <a:endParaRPr lang="en-US" dirty="0"/>
           </a:p>
         </p:txBody>
       </p:sp>
     </p:spTree>
     <p:extLst>
       <p:ext uri="{BB962C8B-B14F-4D97-AF65-F5344CB8AC3E}">
-        <p14:creationId xmlns:p14="http://schemas.microsoft.com/office/powerpoint/2010/main" val="3453209934"/>
+        <p14:creationId xmlns:p14="http://schemas.microsoft.com/office/powerpoint/2010/main" val="2014151608"/>
       </p:ext>
     </p:extLst>
   </p:cSld>
@@ -4037,12 +3976,14 @@
         </p:nvSpPr>
         <p:spPr/>
         <p:txBody>
-          <a:bodyPr/>
+          <a:bodyPr>
+            <a:normAutofit fontScale="90000"/>
+          </a:bodyPr>
           <a:lstStyle/>
           <a:p>
             <a:r>
               <a:rPr lang="en-US" dirty="0" smtClean="0"/>
-              <a:t>Next steps</a:t>
+              <a:t>Implications for reuse, recycling, and dematerialization</a:t>
             </a:r>
             <a:endParaRPr lang="en-US" dirty="0"/>
           </a:p>
@@ -4056,6 +3997,55 @@
           </p:cNvSpPr>
           <p:nvPr>
             <p:ph idx="1"/>
+          </p:nvPr>
+        </p:nvSpPr>
+        <p:spPr/>
+        <p:txBody>
+          <a:bodyPr/>
+          <a:lstStyle/>
+          <a:p>
+            <a:endParaRPr lang="en-US" dirty="0"/>
+          </a:p>
+        </p:txBody>
+      </p:sp>
+    </p:spTree>
+    <p:extLst>
+      <p:ext uri="{BB962C8B-B14F-4D97-AF65-F5344CB8AC3E}">
+        <p14:creationId xmlns:p14="http://schemas.microsoft.com/office/powerpoint/2010/main" val="313968444"/>
+      </p:ext>
+    </p:extLst>
+  </p:cSld>
+  <p:clrMapOvr>
+    <a:masterClrMapping/>
+  </p:clrMapOvr>
+</p:sld>
+</file>
+
+<file path=ppt/slides/slide19.xml><?xml version="1.0" encoding="utf-8"?>
+<p:sld xmlns:a="http://schemas.openxmlformats.org/drawingml/2006/main" xmlns:r="http://schemas.openxmlformats.org/officeDocument/2006/relationships" xmlns:p="http://schemas.openxmlformats.org/presentationml/2006/main">
+  <p:cSld>
+    <p:spTree>
+      <p:nvGrpSpPr>
+        <p:cNvPr id="1" name=""/>
+        <p:cNvGrpSpPr/>
+        <p:nvPr/>
+      </p:nvGrpSpPr>
+      <p:grpSpPr>
+        <a:xfrm>
+          <a:off x="0" y="0"/>
+          <a:ext cx="0" cy="0"/>
+          <a:chOff x="0" y="0"/>
+          <a:chExt cx="0" cy="0"/>
+        </a:xfrm>
+      </p:grpSpPr>
+      <p:sp>
+        <p:nvSpPr>
+          <p:cNvPr id="2" name="Title 1"/>
+          <p:cNvSpPr>
+            <a:spLocks noGrp="1"/>
+          </p:cNvSpPr>
+          <p:nvPr>
+            <p:ph type="title"/>
           </p:nvPr>
         </p:nvSpPr>
         <p:spPr/>
@@ -4065,51 +4055,37 @@
           </a:bodyPr>
           <a:lstStyle/>
           <a:p>
-            <a:pPr marL="514350" indent="-514350">
-              <a:buFont typeface="+mj-lt"/>
-              <a:buAutoNum type="arabicPeriod" startAt="3"/>
-            </a:pPr>
-            <a:r>
-              <a:rPr lang="en-US" dirty="0" smtClean="0"/>
-              <a:t>All </a:t>
-            </a:r>
-            <a:r>
-              <a:rPr lang="en-US" dirty="0"/>
-              <a:t>stocks and inter-sector flows should be provided in physical as well </a:t>
-            </a:r>
-            <a:r>
-              <a:rPr lang="en-US" dirty="0" smtClean="0"/>
-              <a:t>as financial units</a:t>
-            </a:r>
-          </a:p>
-          <a:p>
-            <a:pPr marL="514350" indent="-514350">
-              <a:buFont typeface="+mj-lt"/>
-              <a:buAutoNum type="arabicPeriod" startAt="3"/>
-            </a:pPr>
-            <a:r>
-              <a:rPr lang="en-US" dirty="0" smtClean="0"/>
-              <a:t>US BEA </a:t>
-            </a:r>
-            <a:r>
-              <a:rPr lang="en-US" dirty="0"/>
-              <a:t>should restart detailed Capital, Labor, Energy, Material, </a:t>
-            </a:r>
-            <a:r>
-              <a:rPr lang="en-US" dirty="0" smtClean="0"/>
-              <a:t>and Services </a:t>
-            </a:r>
-            <a:r>
-              <a:rPr lang="en-US" dirty="0"/>
-              <a:t>(KLEMS) reporting</a:t>
-            </a:r>
+            <a:r>
+              <a:rPr lang="en-US" sz="3800" dirty="0" smtClean="0"/>
+              <a:t>Comparison to a steady-state economy</a:t>
+            </a:r>
+            <a:endParaRPr lang="en-US" sz="3800" dirty="0"/>
+          </a:p>
+        </p:txBody>
+      </p:sp>
+      <p:sp>
+        <p:nvSpPr>
+          <p:cNvPr id="3" name="Content Placeholder 2"/>
+          <p:cNvSpPr>
+            <a:spLocks noGrp="1"/>
+          </p:cNvSpPr>
+          <p:nvPr>
+            <p:ph idx="1"/>
+          </p:nvPr>
+        </p:nvSpPr>
+        <p:spPr/>
+        <p:txBody>
+          <a:bodyPr/>
+          <a:lstStyle/>
+          <a:p>
+            <a:endParaRPr lang="en-US"/>
           </a:p>
         </p:txBody>
       </p:sp>
     </p:spTree>
     <p:extLst>
       <p:ext uri="{BB962C8B-B14F-4D97-AF65-F5344CB8AC3E}">
-        <p14:creationId xmlns:p14="http://schemas.microsoft.com/office/powerpoint/2010/main" val="2466005101"/>
+        <p14:creationId xmlns:p14="http://schemas.microsoft.com/office/powerpoint/2010/main" val="3042453117"/>
       </p:ext>
     </p:extLst>
   </p:cSld>
@@ -4193,6 +4169,298 @@
     <p:extLst>
       <p:ext uri="{BB962C8B-B14F-4D97-AF65-F5344CB8AC3E}">
         <p14:creationId xmlns:p14="http://schemas.microsoft.com/office/powerpoint/2010/main" val="3846849370"/>
+      </p:ext>
+    </p:extLst>
+  </p:cSld>
+  <p:clrMapOvr>
+    <a:masterClrMapping/>
+  </p:clrMapOvr>
+</p:sld>
+</file>
+
+<file path=ppt/slides/slide20.xml><?xml version="1.0" encoding="utf-8"?>
+<p:sld xmlns:a="http://schemas.openxmlformats.org/drawingml/2006/main" xmlns:r="http://schemas.openxmlformats.org/officeDocument/2006/relationships" xmlns:p="http://schemas.openxmlformats.org/presentationml/2006/main">
+  <p:cSld>
+    <p:spTree>
+      <p:nvGrpSpPr>
+        <p:cNvPr id="1" name=""/>
+        <p:cNvGrpSpPr/>
+        <p:nvPr/>
+      </p:nvGrpSpPr>
+      <p:grpSpPr>
+        <a:xfrm>
+          <a:off x="0" y="0"/>
+          <a:ext cx="0" cy="0"/>
+          <a:chOff x="0" y="0"/>
+          <a:chExt cx="0" cy="0"/>
+        </a:xfrm>
+      </p:grpSpPr>
+      <p:sp>
+        <p:nvSpPr>
+          <p:cNvPr id="2" name="Title 1"/>
+          <p:cNvSpPr>
+            <a:spLocks noGrp="1"/>
+          </p:cNvSpPr>
+          <p:nvPr>
+            <p:ph type="title"/>
+          </p:nvPr>
+        </p:nvSpPr>
+        <p:spPr/>
+        <p:txBody>
+          <a:bodyPr/>
+          <a:lstStyle/>
+          <a:p>
+            <a:r>
+              <a:rPr lang="en-US" dirty="0" smtClean="0"/>
+              <a:t>Next steps</a:t>
+            </a:r>
+            <a:endParaRPr lang="en-US" dirty="0"/>
+          </a:p>
+        </p:txBody>
+      </p:sp>
+      <p:sp>
+        <p:nvSpPr>
+          <p:cNvPr id="3" name="Content Placeholder 2"/>
+          <p:cNvSpPr>
+            <a:spLocks noGrp="1"/>
+          </p:cNvSpPr>
+          <p:nvPr>
+            <p:ph idx="1"/>
+          </p:nvPr>
+        </p:nvSpPr>
+        <p:spPr/>
+        <p:txBody>
+          <a:bodyPr>
+            <a:normAutofit fontScale="77500" lnSpcReduction="20000"/>
+          </a:bodyPr>
+          <a:lstStyle/>
+          <a:p>
+            <a:pPr marL="514350" indent="-514350">
+              <a:buFont typeface="+mj-lt"/>
+              <a:buAutoNum type="arabicPeriod"/>
+            </a:pPr>
+            <a:r>
+              <a:rPr lang="en-US" dirty="0" smtClean="0"/>
+              <a:t>Data </a:t>
+            </a:r>
+            <a:r>
+              <a:rPr lang="en-US" dirty="0"/>
+              <a:t>on stocks and inter-sector flows should be reported by a single, </a:t>
+            </a:r>
+            <a:r>
+              <a:rPr lang="en-US" dirty="0" smtClean="0"/>
+              <a:t>centralized agency.</a:t>
+            </a:r>
+          </a:p>
+          <a:p>
+            <a:pPr marL="514350" indent="-514350">
+              <a:buFont typeface="+mj-lt"/>
+              <a:buAutoNum type="arabicPeriod"/>
+            </a:pPr>
+            <a:r>
+              <a:rPr lang="en-US" dirty="0" smtClean="0"/>
+              <a:t>National accounts should</a:t>
+            </a:r>
+          </a:p>
+          <a:p>
+            <a:pPr marL="914400" lvl="1" indent="-514350">
+              <a:buFont typeface="+mj-lt"/>
+              <a:buAutoNum type="alphaLcPeriod"/>
+            </a:pPr>
+            <a:r>
+              <a:rPr lang="en-US" dirty="0" smtClean="0"/>
+              <a:t>include non-market exchanges</a:t>
+            </a:r>
+          </a:p>
+          <a:p>
+            <a:pPr marL="914400" lvl="1" indent="-514350">
+              <a:buFont typeface="+mj-lt"/>
+              <a:buAutoNum type="alphaLcPeriod"/>
+            </a:pPr>
+            <a:r>
+              <a:rPr lang="en-US" dirty="0" smtClean="0"/>
+              <a:t>maintain balance sheets for both natural and manufactured capital</a:t>
+            </a:r>
+          </a:p>
+          <a:p>
+            <a:pPr marL="914400" lvl="1" indent="-514350">
+              <a:buFont typeface="+mj-lt"/>
+              <a:buAutoNum type="alphaLcPeriod"/>
+            </a:pPr>
+            <a:r>
+              <a:rPr lang="en-US" dirty="0" smtClean="0"/>
+              <a:t>provide </a:t>
+            </a:r>
+            <a:r>
+              <a:rPr lang="en-US" dirty="0"/>
+              <a:t>additional </a:t>
+            </a:r>
+            <a:r>
+              <a:rPr lang="en-US" dirty="0" smtClean="0"/>
+              <a:t>disaggregated values for </a:t>
+            </a:r>
+            <a:r>
+              <a:rPr lang="en-US" dirty="0"/>
+              <a:t>waste </a:t>
+            </a:r>
+            <a:r>
+              <a:rPr lang="en-US" dirty="0" smtClean="0"/>
+              <a:t>flows in physical units</a:t>
+            </a:r>
+          </a:p>
+          <a:p>
+            <a:pPr marL="914400" lvl="1" indent="-514350">
+              <a:buFont typeface="+mj-lt"/>
+              <a:buAutoNum type="alphaLcPeriod"/>
+            </a:pPr>
+            <a:r>
+              <a:rPr lang="en-US" dirty="0" smtClean="0"/>
+              <a:t>routinely </a:t>
+            </a:r>
+            <a:r>
+              <a:rPr lang="en-US" dirty="0"/>
+              <a:t>estimate the energy </a:t>
+            </a:r>
+            <a:r>
+              <a:rPr lang="en-US" dirty="0" smtClean="0"/>
+              <a:t>intensity of </a:t>
+            </a:r>
+            <a:r>
+              <a:rPr lang="en-US" dirty="0"/>
+              <a:t>economic products using a physical accounting </a:t>
+            </a:r>
+            <a:r>
+              <a:rPr lang="en-US" dirty="0" smtClean="0"/>
+              <a:t>framework</a:t>
+            </a:r>
+          </a:p>
+          <a:p>
+            <a:pPr marL="914400" lvl="1" indent="-514350">
+              <a:buFont typeface="+mj-lt"/>
+              <a:buAutoNum type="alphaLcPeriod"/>
+            </a:pPr>
+            <a:r>
+              <a:rPr lang="en-US" dirty="0" smtClean="0"/>
+              <a:t>be estimated and disseminated on an annual basis</a:t>
+            </a:r>
+          </a:p>
+        </p:txBody>
+      </p:sp>
+    </p:spTree>
+    <p:extLst>
+      <p:ext uri="{BB962C8B-B14F-4D97-AF65-F5344CB8AC3E}">
+        <p14:creationId xmlns:p14="http://schemas.microsoft.com/office/powerpoint/2010/main" val="3453209934"/>
+      </p:ext>
+    </p:extLst>
+  </p:cSld>
+  <p:clrMapOvr>
+    <a:masterClrMapping/>
+  </p:clrMapOvr>
+</p:sld>
+</file>
+
+<file path=ppt/slides/slide21.xml><?xml version="1.0" encoding="utf-8"?>
+<p:sld xmlns:a="http://schemas.openxmlformats.org/drawingml/2006/main" xmlns:r="http://schemas.openxmlformats.org/officeDocument/2006/relationships" xmlns:p="http://schemas.openxmlformats.org/presentationml/2006/main">
+  <p:cSld>
+    <p:spTree>
+      <p:nvGrpSpPr>
+        <p:cNvPr id="1" name=""/>
+        <p:cNvGrpSpPr/>
+        <p:nvPr/>
+      </p:nvGrpSpPr>
+      <p:grpSpPr>
+        <a:xfrm>
+          <a:off x="0" y="0"/>
+          <a:ext cx="0" cy="0"/>
+          <a:chOff x="0" y="0"/>
+          <a:chExt cx="0" cy="0"/>
+        </a:xfrm>
+      </p:grpSpPr>
+      <p:sp>
+        <p:nvSpPr>
+          <p:cNvPr id="2" name="Title 1"/>
+          <p:cNvSpPr>
+            <a:spLocks noGrp="1"/>
+          </p:cNvSpPr>
+          <p:nvPr>
+            <p:ph type="title"/>
+          </p:nvPr>
+        </p:nvSpPr>
+        <p:spPr/>
+        <p:txBody>
+          <a:bodyPr/>
+          <a:lstStyle/>
+          <a:p>
+            <a:r>
+              <a:rPr lang="en-US" dirty="0" smtClean="0"/>
+              <a:t>Next steps</a:t>
+            </a:r>
+            <a:endParaRPr lang="en-US" dirty="0"/>
+          </a:p>
+        </p:txBody>
+      </p:sp>
+      <p:sp>
+        <p:nvSpPr>
+          <p:cNvPr id="3" name="Content Placeholder 2"/>
+          <p:cNvSpPr>
+            <a:spLocks noGrp="1"/>
+          </p:cNvSpPr>
+          <p:nvPr>
+            <p:ph idx="1"/>
+          </p:nvPr>
+        </p:nvSpPr>
+        <p:spPr/>
+        <p:txBody>
+          <a:bodyPr>
+            <a:normAutofit/>
+          </a:bodyPr>
+          <a:lstStyle/>
+          <a:p>
+            <a:pPr marL="514350" indent="-514350">
+              <a:buFont typeface="+mj-lt"/>
+              <a:buAutoNum type="arabicPeriod" startAt="3"/>
+            </a:pPr>
+            <a:r>
+              <a:rPr lang="en-US" dirty="0" smtClean="0"/>
+              <a:t>All </a:t>
+            </a:r>
+            <a:r>
+              <a:rPr lang="en-US" dirty="0"/>
+              <a:t>stocks and inter-sector flows should be provided in physical as well </a:t>
+            </a:r>
+            <a:r>
+              <a:rPr lang="en-US" dirty="0" smtClean="0"/>
+              <a:t>as financial units</a:t>
+            </a:r>
+          </a:p>
+          <a:p>
+            <a:pPr marL="514350" indent="-514350">
+              <a:buFont typeface="+mj-lt"/>
+              <a:buAutoNum type="arabicPeriod" startAt="3"/>
+            </a:pPr>
+            <a:r>
+              <a:rPr lang="en-US" dirty="0" smtClean="0"/>
+              <a:t>US BEA </a:t>
+            </a:r>
+            <a:r>
+              <a:rPr lang="en-US" dirty="0"/>
+              <a:t>should restart detailed Capital, Labor, Energy, Material, </a:t>
+            </a:r>
+            <a:r>
+              <a:rPr lang="en-US" dirty="0" smtClean="0"/>
+              <a:t>and Services </a:t>
+            </a:r>
+            <a:r>
+              <a:rPr lang="en-US" dirty="0"/>
+              <a:t>(KLEMS) reporting</a:t>
+            </a:r>
+          </a:p>
+        </p:txBody>
+      </p:sp>
+    </p:spTree>
+    <p:extLst>
+      <p:ext uri="{BB962C8B-B14F-4D97-AF65-F5344CB8AC3E}">
+        <p14:creationId xmlns:p14="http://schemas.microsoft.com/office/powerpoint/2010/main" val="2466005101"/>
       </p:ext>
     </p:extLst>
   </p:cSld>

</xml_diff>

<commit_message>
book launch slides with implications
</commit_message>
<xml_diff>
--- a/Book_launch/Book_launch_MCD_v2.pptx
+++ b/Book_launch/Book_launch_MCD_v2.pptx
@@ -22,10 +22,16 @@
     <p:sldId id="270" r:id="rId16"/>
     <p:sldId id="271" r:id="rId17"/>
     <p:sldId id="275" r:id="rId18"/>
-    <p:sldId id="276" r:id="rId19"/>
-    <p:sldId id="277" r:id="rId20"/>
-    <p:sldId id="273" r:id="rId21"/>
-    <p:sldId id="274" r:id="rId22"/>
+    <p:sldId id="279" r:id="rId19"/>
+    <p:sldId id="280" r:id="rId20"/>
+    <p:sldId id="276" r:id="rId21"/>
+    <p:sldId id="277" r:id="rId22"/>
+    <p:sldId id="281" r:id="rId23"/>
+    <p:sldId id="282" r:id="rId24"/>
+    <p:sldId id="283" r:id="rId25"/>
+    <p:sldId id="284" r:id="rId26"/>
+    <p:sldId id="273" r:id="rId27"/>
+    <p:sldId id="274" r:id="rId28"/>
   </p:sldIdLst>
   <p:sldSz cx="9144000" cy="5715000" type="screen16x10"/>
   <p:notesSz cx="6858000" cy="9144000"/>
@@ -3794,8 +3800,38 @@
         </p:nvSpPr>
         <p:spPr/>
         <p:txBody>
-          <a:bodyPr/>
-          <a:lstStyle/>
+          <a:bodyPr>
+            <a:normAutofit fontScale="92500" lnSpcReduction="10000"/>
+          </a:bodyPr>
+          <a:lstStyle/>
+          <a:p>
+            <a:r>
+              <a:rPr lang="en-US" dirty="0" smtClean="0"/>
+              <a:t>Natural capital is depleted to:</a:t>
+            </a:r>
+          </a:p>
+          <a:p>
+            <a:pPr lvl="1"/>
+            <a:r>
+              <a:rPr lang="en-US" dirty="0" smtClean="0"/>
+              <a:t>provide short-lived goods flows</a:t>
+            </a:r>
+          </a:p>
+          <a:p>
+            <a:pPr lvl="1"/>
+            <a:r>
+              <a:rPr lang="en-US" dirty="0" smtClean="0"/>
+              <a:t>increase manufactured capital stock</a:t>
+            </a:r>
+          </a:p>
+          <a:p>
+            <a:pPr lvl="1"/>
+            <a:r>
+              <a:rPr lang="en-US" dirty="0" smtClean="0"/>
+              <a:t>overcome depreciation of capital</a:t>
+            </a:r>
+            <a:endParaRPr lang="en-US" dirty="0" smtClean="0"/>
+          </a:p>
           <a:p>
             <a:r>
               <a:rPr lang="en-US" dirty="0" smtClean="0"/>
@@ -3890,12 +3926,18 @@
         </p:nvSpPr>
         <p:spPr/>
         <p:txBody>
-          <a:bodyPr/>
-          <a:lstStyle/>
-          <a:p>
+          <a:bodyPr>
+            <a:normAutofit fontScale="92500" lnSpcReduction="20000"/>
+          </a:bodyPr>
+          <a:lstStyle/>
+          <a:p>
+            <a:r>
+              <a:rPr lang="en-US" dirty="0" smtClean="0"/>
+              <a:t>Across </a:t>
+            </a:r>
             <a:r>
               <a:rPr lang="en-US" dirty="0"/>
-              <a:t> Across the world, economic health </a:t>
+              <a:t>the world, economic health </a:t>
             </a:r>
             <a:r>
               <a:rPr lang="en-US" dirty="0" smtClean="0"/>
@@ -3918,15 +3960,41 @@
             </a:r>
             <a:r>
               <a:rPr lang="en-US" dirty="0"/>
-              <a:t>GDP grows, the economy is said to </a:t>
-            </a:r>
-            <a:r>
-              <a:rPr lang="en-US"/>
-              <a:t>be </a:t>
-            </a:r>
-            <a:r>
-              <a:rPr lang="en-US" smtClean="0"/>
+              <a:t>GDP grows, the economy is said to be </a:t>
+            </a:r>
+            <a:r>
+              <a:rPr lang="en-US" dirty="0" smtClean="0"/>
               <a:t>growing</a:t>
+            </a:r>
+          </a:p>
+          <a:p>
+            <a:r>
+              <a:rPr lang="en-US" dirty="0" smtClean="0"/>
+              <a:t>GDP is a flow of value in units of $/year</a:t>
+            </a:r>
+          </a:p>
+          <a:p>
+            <a:r>
+              <a:rPr lang="en-US" dirty="0" smtClean="0"/>
+              <a:t>A </a:t>
+            </a:r>
+            <a:r>
+              <a:rPr lang="en-US" dirty="0"/>
+              <a:t>second possible measure of economic well-being is a </a:t>
+            </a:r>
+            <a:r>
+              <a:rPr lang="en-US" dirty="0" smtClean="0"/>
+              <a:t>stock; wealth</a:t>
+            </a:r>
+          </a:p>
+          <a:p>
+            <a:r>
+              <a:rPr lang="en-US" dirty="0"/>
+              <a:t>A</a:t>
+            </a:r>
+            <a:r>
+              <a:rPr lang="en-US" dirty="0" smtClean="0"/>
+              <a:t>ccumulation of embodied energy (in manufactured capital) is another measure of economic well-being.</a:t>
             </a:r>
           </a:p>
           <a:p>
@@ -3976,42 +4044,109 @@
         </p:nvSpPr>
         <p:spPr/>
         <p:txBody>
-          <a:bodyPr>
-            <a:normAutofit fontScale="90000"/>
+          <a:bodyPr/>
+          <a:lstStyle/>
+          <a:p>
+            <a:r>
+              <a:rPr lang="en-US" dirty="0" smtClean="0"/>
+              <a:t>Insight from the Red Queen</a:t>
+            </a:r>
+            <a:endParaRPr lang="en-US" dirty="0"/>
+          </a:p>
+        </p:txBody>
+      </p:sp>
+      <p:pic>
+        <p:nvPicPr>
+          <p:cNvPr id="4" name="Picture 3"/>
+          <p:cNvPicPr>
+            <a:picLocks noChangeAspect="1"/>
+          </p:cNvPicPr>
+          <p:nvPr/>
+        </p:nvPicPr>
+        <p:blipFill>
+          <a:blip r:embed="rId2"/>
+          <a:stretch>
+            <a:fillRect/>
+          </a:stretch>
+        </p:blipFill>
+        <p:spPr>
+          <a:xfrm>
+            <a:off x="2007794" y="1195717"/>
+            <a:ext cx="5105740" cy="3225969"/>
+          </a:xfrm>
+          <a:prstGeom prst="rect">
+            <a:avLst/>
+          </a:prstGeom>
+        </p:spPr>
+      </p:pic>
+      <p:sp>
+        <p:nvSpPr>
+          <p:cNvPr id="5" name="TextBox 4"/>
+          <p:cNvSpPr txBox="1"/>
+          <p:nvPr/>
+        </p:nvSpPr>
+        <p:spPr>
+          <a:xfrm>
+            <a:off x="457200" y="4397235"/>
+            <a:ext cx="8229600" cy="1354217"/>
+          </a:xfrm>
+          <a:prstGeom prst="rect">
+            <a:avLst/>
+          </a:prstGeom>
+          <a:noFill/>
+        </p:spPr>
+        <p:txBody>
+          <a:bodyPr wrap="square" rtlCol="0">
+            <a:spAutoFit/>
           </a:bodyPr>
           <a:lstStyle/>
           <a:p>
-            <a:r>
-              <a:rPr lang="en-US" dirty="0" smtClean="0"/>
-              <a:t>Implications for reuse, recycling, and dematerialization</a:t>
-            </a:r>
-            <a:endParaRPr lang="en-US" dirty="0"/>
-          </a:p>
-        </p:txBody>
-      </p:sp>
-      <p:sp>
-        <p:nvSpPr>
-          <p:cNvPr id="3" name="Content Placeholder 2"/>
-          <p:cNvSpPr>
-            <a:spLocks noGrp="1"/>
-          </p:cNvSpPr>
-          <p:nvPr>
-            <p:ph idx="1"/>
-          </p:nvPr>
-        </p:nvSpPr>
-        <p:spPr/>
-        <p:txBody>
-          <a:bodyPr/>
-          <a:lstStyle/>
-          <a:p>
-            <a:endParaRPr lang="en-US" dirty="0"/>
+            <a:pPr algn="ctr"/>
+            <a:r>
+              <a:rPr lang="en-US" sz="1600" i="1" dirty="0" smtClean="0"/>
+              <a:t>“Now, here, you see, it takes all the running you can do, to keep in the same place. If you want to get somewhere else, you must run at least twice as fast as that!”</a:t>
+            </a:r>
+          </a:p>
+          <a:p>
+            <a:pPr algn="r"/>
+            <a:r>
+              <a:rPr lang="en-US" sz="1600" dirty="0" smtClean="0"/>
+              <a:t>—Lewis Carroll (1897) </a:t>
+            </a:r>
+          </a:p>
+          <a:p>
+            <a:pPr algn="r"/>
+            <a:r>
+              <a:rPr lang="en-US" sz="1600" i="1" dirty="0" smtClean="0"/>
+              <a:t>Through the Looking-Glass and What Alice Found There</a:t>
+            </a:r>
+            <a:r>
+              <a:rPr lang="en-US" sz="1600" dirty="0" smtClean="0"/>
+              <a:t>.</a:t>
+            </a:r>
+          </a:p>
+          <a:p>
+            <a:pPr algn="r"/>
+            <a:r>
+              <a:rPr lang="en-US" sz="1600" dirty="0" smtClean="0"/>
+              <a:t>Henry </a:t>
+            </a:r>
+            <a:r>
+              <a:rPr lang="en-US" sz="1600" dirty="0" err="1" smtClean="0"/>
+              <a:t>Altemus</a:t>
+            </a:r>
+            <a:r>
+              <a:rPr lang="en-US" sz="1600" dirty="0" smtClean="0"/>
+              <a:t> Company, Philadelphia, p. 49.</a:t>
+            </a:r>
+            <a:endParaRPr lang="en-US" sz="1600" dirty="0"/>
           </a:p>
         </p:txBody>
       </p:sp>
     </p:spTree>
     <p:extLst>
       <p:ext uri="{BB962C8B-B14F-4D97-AF65-F5344CB8AC3E}">
-        <p14:creationId xmlns:p14="http://schemas.microsoft.com/office/powerpoint/2010/main" val="313968444"/>
+        <p14:creationId xmlns:p14="http://schemas.microsoft.com/office/powerpoint/2010/main" val="2673227883"/>
       </p:ext>
     </p:extLst>
   </p:cSld>
@@ -4050,42 +4185,84 @@
         </p:nvSpPr>
         <p:spPr/>
         <p:txBody>
+          <a:bodyPr/>
+          <a:lstStyle/>
+          <a:p>
+            <a:r>
+              <a:rPr lang="en-US" dirty="0" smtClean="0"/>
+              <a:t>Implications for economic growth</a:t>
+            </a:r>
+            <a:endParaRPr lang="en-US" dirty="0"/>
+          </a:p>
+        </p:txBody>
+      </p:sp>
+      <p:sp>
+        <p:nvSpPr>
+          <p:cNvPr id="3" name="Content Placeholder 2"/>
+          <p:cNvSpPr>
+            <a:spLocks noGrp="1"/>
+          </p:cNvSpPr>
+          <p:nvPr>
+            <p:ph idx="1"/>
+          </p:nvPr>
+        </p:nvSpPr>
+        <p:spPr>
+          <a:xfrm>
+            <a:off x="457200" y="1333499"/>
+            <a:ext cx="8229600" cy="4179455"/>
+          </a:xfrm>
+        </p:spPr>
+        <p:txBody>
           <a:bodyPr>
             <a:normAutofit/>
           </a:bodyPr>
           <a:lstStyle/>
           <a:p>
             <a:r>
-              <a:rPr lang="en-US" sz="3800" dirty="0" smtClean="0"/>
-              <a:t>Comparison to a steady-state economy</a:t>
-            </a:r>
-            <a:endParaRPr lang="en-US" sz="3800" dirty="0"/>
-          </a:p>
-        </p:txBody>
-      </p:sp>
-      <p:sp>
-        <p:nvSpPr>
-          <p:cNvPr id="3" name="Content Placeholder 2"/>
-          <p:cNvSpPr>
-            <a:spLocks noGrp="1"/>
-          </p:cNvSpPr>
-          <p:nvPr>
-            <p:ph idx="1"/>
-          </p:nvPr>
-        </p:nvSpPr>
-        <p:spPr/>
-        <p:txBody>
-          <a:bodyPr/>
-          <a:lstStyle/>
-          <a:p>
-            <a:endParaRPr lang="en-US"/>
+              <a:rPr lang="en-US" dirty="0" smtClean="0"/>
+              <a:t>As capital stocks increase we need to:</a:t>
+            </a:r>
+          </a:p>
+          <a:p>
+            <a:pPr lvl="1"/>
+            <a:r>
+              <a:rPr lang="en-US" dirty="0" smtClean="0"/>
+              <a:t>purchase direct energy to power the capital,</a:t>
+            </a:r>
+          </a:p>
+          <a:p>
+            <a:pPr lvl="1"/>
+            <a:r>
+              <a:rPr lang="en-US" dirty="0" smtClean="0"/>
+              <a:t>purchase resources to ‘feed’ and maintain the capital,</a:t>
+            </a:r>
+          </a:p>
+          <a:p>
+            <a:pPr lvl="1"/>
+            <a:r>
+              <a:rPr lang="en-US" dirty="0" smtClean="0"/>
+              <a:t>pay workers to operate the capital</a:t>
+            </a:r>
+          </a:p>
+          <a:p>
+            <a:pPr lvl="1"/>
+            <a:r>
+              <a:rPr lang="en-US" dirty="0" smtClean="0"/>
+              <a:t>offset increasing depreciation</a:t>
+            </a:r>
+          </a:p>
+          <a:p>
+            <a:r>
+              <a:rPr lang="en-US" dirty="0" smtClean="0"/>
+              <a:t>Increasing capital stock ‘lock in’ increased throughput of materials and energy</a:t>
+            </a:r>
           </a:p>
         </p:txBody>
       </p:sp>
     </p:spTree>
     <p:extLst>
       <p:ext uri="{BB962C8B-B14F-4D97-AF65-F5344CB8AC3E}">
-        <p14:creationId xmlns:p14="http://schemas.microsoft.com/office/powerpoint/2010/main" val="3042453117"/>
+        <p14:creationId xmlns:p14="http://schemas.microsoft.com/office/powerpoint/2010/main" val="3643150092"/>
       </p:ext>
     </p:extLst>
   </p:cSld>
@@ -4207,6 +4384,695 @@
         </p:nvSpPr>
         <p:spPr/>
         <p:txBody>
+          <a:bodyPr>
+            <a:normAutofit fontScale="90000"/>
+          </a:bodyPr>
+          <a:lstStyle/>
+          <a:p>
+            <a:r>
+              <a:rPr lang="en-US" dirty="0" smtClean="0"/>
+              <a:t>Implications for reuse, recycling, and dematerialization</a:t>
+            </a:r>
+            <a:endParaRPr lang="en-US" dirty="0"/>
+          </a:p>
+        </p:txBody>
+      </p:sp>
+      <p:sp>
+        <p:nvSpPr>
+          <p:cNvPr id="3" name="Content Placeholder 2"/>
+          <p:cNvSpPr>
+            <a:spLocks noGrp="1"/>
+          </p:cNvSpPr>
+          <p:nvPr>
+            <p:ph idx="1"/>
+          </p:nvPr>
+        </p:nvSpPr>
+        <p:spPr/>
+        <p:txBody>
+          <a:bodyPr>
+            <a:normAutofit lnSpcReduction="10000"/>
+          </a:bodyPr>
+          <a:lstStyle/>
+          <a:p>
+            <a:r>
+              <a:rPr lang="en-US" dirty="0" smtClean="0"/>
+              <a:t>Dematerialization:</a:t>
+            </a:r>
+          </a:p>
+          <a:p>
+            <a:pPr lvl="1"/>
+            <a:r>
+              <a:rPr lang="en-US" dirty="0" smtClean="0"/>
+              <a:t>economic activity can be unlinked from material or energy demands</a:t>
+            </a:r>
+          </a:p>
+          <a:p>
+            <a:r>
+              <a:rPr lang="en-US" dirty="0" smtClean="0"/>
+              <a:t>Recycling:</a:t>
+            </a:r>
+          </a:p>
+          <a:p>
+            <a:pPr lvl="1"/>
+            <a:r>
+              <a:rPr lang="en-US" dirty="0" smtClean="0"/>
+              <a:t>reduces material depreciation and waste</a:t>
+            </a:r>
+          </a:p>
+          <a:p>
+            <a:pPr lvl="1"/>
+            <a:r>
+              <a:rPr lang="en-US" dirty="0" smtClean="0"/>
+              <a:t>may increase energy demand</a:t>
+            </a:r>
+          </a:p>
+          <a:p>
+            <a:pPr lvl="1"/>
+            <a:r>
+              <a:rPr lang="en-US" dirty="0" smtClean="0"/>
+              <a:t>may indirectly cause increase in growth of capital stock (rebound effect)</a:t>
+            </a:r>
+          </a:p>
+          <a:p>
+            <a:endParaRPr lang="en-US" dirty="0"/>
+          </a:p>
+        </p:txBody>
+      </p:sp>
+    </p:spTree>
+    <p:extLst>
+      <p:ext uri="{BB962C8B-B14F-4D97-AF65-F5344CB8AC3E}">
+        <p14:creationId xmlns:p14="http://schemas.microsoft.com/office/powerpoint/2010/main" val="313968444"/>
+      </p:ext>
+    </p:extLst>
+  </p:cSld>
+  <p:clrMapOvr>
+    <a:masterClrMapping/>
+  </p:clrMapOvr>
+</p:sld>
+</file>
+
+<file path=ppt/slides/slide21.xml><?xml version="1.0" encoding="utf-8"?>
+<p:sld xmlns:a="http://schemas.openxmlformats.org/drawingml/2006/main" xmlns:r="http://schemas.openxmlformats.org/officeDocument/2006/relationships" xmlns:p="http://schemas.openxmlformats.org/presentationml/2006/main">
+  <p:cSld>
+    <p:spTree>
+      <p:nvGrpSpPr>
+        <p:cNvPr id="1" name=""/>
+        <p:cNvGrpSpPr/>
+        <p:nvPr/>
+      </p:nvGrpSpPr>
+      <p:grpSpPr>
+        <a:xfrm>
+          <a:off x="0" y="0"/>
+          <a:ext cx="0" cy="0"/>
+          <a:chOff x="0" y="0"/>
+          <a:chExt cx="0" cy="0"/>
+        </a:xfrm>
+      </p:grpSpPr>
+      <p:sp>
+        <p:nvSpPr>
+          <p:cNvPr id="2" name="Title 1"/>
+          <p:cNvSpPr>
+            <a:spLocks noGrp="1"/>
+          </p:cNvSpPr>
+          <p:nvPr>
+            <p:ph type="title"/>
+          </p:nvPr>
+        </p:nvSpPr>
+        <p:spPr/>
+        <p:txBody>
+          <a:bodyPr>
+            <a:normAutofit/>
+          </a:bodyPr>
+          <a:lstStyle/>
+          <a:p>
+            <a:r>
+              <a:rPr lang="en-US" sz="3800" dirty="0" smtClean="0"/>
+              <a:t>Comparison to a steady-state economy</a:t>
+            </a:r>
+            <a:endParaRPr lang="en-US" sz="3800" dirty="0"/>
+          </a:p>
+        </p:txBody>
+      </p:sp>
+      <p:sp>
+        <p:nvSpPr>
+          <p:cNvPr id="3" name="Content Placeholder 2"/>
+          <p:cNvSpPr>
+            <a:spLocks noGrp="1"/>
+          </p:cNvSpPr>
+          <p:nvPr>
+            <p:ph idx="1"/>
+          </p:nvPr>
+        </p:nvSpPr>
+        <p:spPr/>
+        <p:txBody>
+          <a:bodyPr/>
+          <a:lstStyle/>
+          <a:p>
+            <a:r>
+              <a:rPr lang="en-US" dirty="0" smtClean="0"/>
+              <a:t>Three possible criteria for steady-state:</a:t>
+            </a:r>
+          </a:p>
+          <a:p>
+            <a:pPr lvl="1"/>
+            <a:r>
+              <a:rPr lang="en-US" dirty="0" smtClean="0"/>
+              <a:t>constant level of capital stock</a:t>
+            </a:r>
+          </a:p>
+          <a:p>
+            <a:pPr lvl="1"/>
+            <a:r>
+              <a:rPr lang="en-US" dirty="0" smtClean="0"/>
+              <a:t>constant material throughput</a:t>
+            </a:r>
+          </a:p>
+          <a:p>
+            <a:pPr lvl="1"/>
+            <a:r>
+              <a:rPr lang="en-US" dirty="0" smtClean="0"/>
+              <a:t>constant level of GDP</a:t>
+            </a:r>
+          </a:p>
+          <a:p>
+            <a:pPr lvl="1"/>
+            <a:endParaRPr lang="en-US" dirty="0"/>
+          </a:p>
+        </p:txBody>
+      </p:sp>
+    </p:spTree>
+    <p:extLst>
+      <p:ext uri="{BB962C8B-B14F-4D97-AF65-F5344CB8AC3E}">
+        <p14:creationId xmlns:p14="http://schemas.microsoft.com/office/powerpoint/2010/main" val="3042453117"/>
+      </p:ext>
+    </p:extLst>
+  </p:cSld>
+  <p:clrMapOvr>
+    <a:masterClrMapping/>
+  </p:clrMapOvr>
+</p:sld>
+</file>
+
+<file path=ppt/slides/slide22.xml><?xml version="1.0" encoding="utf-8"?>
+<p:sld xmlns:a="http://schemas.openxmlformats.org/drawingml/2006/main" xmlns:r="http://schemas.openxmlformats.org/officeDocument/2006/relationships" xmlns:p="http://schemas.openxmlformats.org/presentationml/2006/main">
+  <p:cSld>
+    <p:spTree>
+      <p:nvGrpSpPr>
+        <p:cNvPr id="1" name=""/>
+        <p:cNvGrpSpPr/>
+        <p:nvPr/>
+      </p:nvGrpSpPr>
+      <p:grpSpPr>
+        <a:xfrm>
+          <a:off x="0" y="0"/>
+          <a:ext cx="0" cy="0"/>
+          <a:chOff x="0" y="0"/>
+          <a:chExt cx="0" cy="0"/>
+        </a:xfrm>
+      </p:grpSpPr>
+      <p:sp>
+        <p:nvSpPr>
+          <p:cNvPr id="2" name="Title 1"/>
+          <p:cNvSpPr>
+            <a:spLocks noGrp="1"/>
+          </p:cNvSpPr>
+          <p:nvPr>
+            <p:ph type="title"/>
+          </p:nvPr>
+        </p:nvSpPr>
+        <p:spPr/>
+        <p:txBody>
+          <a:bodyPr>
+            <a:normAutofit fontScale="90000"/>
+          </a:bodyPr>
+          <a:lstStyle/>
+          <a:p>
+            <a:r>
+              <a:rPr lang="en-US" sz="3800" dirty="0" smtClean="0"/>
+              <a:t>Steady-state economy: constant capital stock</a:t>
+            </a:r>
+            <a:endParaRPr lang="en-US" sz="3800" dirty="0"/>
+          </a:p>
+        </p:txBody>
+      </p:sp>
+      <p:sp>
+        <p:nvSpPr>
+          <p:cNvPr id="3" name="Content Placeholder 2"/>
+          <p:cNvSpPr>
+            <a:spLocks noGrp="1"/>
+          </p:cNvSpPr>
+          <p:nvPr>
+            <p:ph idx="1"/>
+          </p:nvPr>
+        </p:nvSpPr>
+        <p:spPr/>
+        <p:txBody>
+          <a:bodyPr/>
+          <a:lstStyle/>
+          <a:p>
+            <a:r>
+              <a:rPr lang="en-US" dirty="0" smtClean="0"/>
+              <a:t>Natural capital is depleted for:</a:t>
+            </a:r>
+          </a:p>
+          <a:p>
+            <a:pPr lvl="1"/>
+            <a:r>
+              <a:rPr lang="en-US" dirty="0" smtClean="0"/>
+              <a:t>providing short-lived goods flows</a:t>
+            </a:r>
+          </a:p>
+          <a:p>
+            <a:pPr lvl="1"/>
+            <a:r>
+              <a:rPr lang="en-US" strike="sngStrike" dirty="0" smtClean="0">
+                <a:solidFill>
+                  <a:srgbClr val="FF0000"/>
+                </a:solidFill>
+              </a:rPr>
+              <a:t>increasing manufactured capital stock</a:t>
+            </a:r>
+          </a:p>
+          <a:p>
+            <a:pPr lvl="1"/>
+            <a:r>
+              <a:rPr lang="en-US" dirty="0" smtClean="0"/>
+              <a:t>overcoming depreciation of capital</a:t>
+            </a:r>
+          </a:p>
+        </p:txBody>
+      </p:sp>
+    </p:spTree>
+    <p:extLst>
+      <p:ext uri="{BB962C8B-B14F-4D97-AF65-F5344CB8AC3E}">
+        <p14:creationId xmlns:p14="http://schemas.microsoft.com/office/powerpoint/2010/main" val="2859839571"/>
+      </p:ext>
+    </p:extLst>
+  </p:cSld>
+  <p:clrMapOvr>
+    <a:masterClrMapping/>
+  </p:clrMapOvr>
+</p:sld>
+</file>
+
+<file path=ppt/slides/slide23.xml><?xml version="1.0" encoding="utf-8"?>
+<p:sld xmlns:a="http://schemas.openxmlformats.org/drawingml/2006/main" xmlns:r="http://schemas.openxmlformats.org/officeDocument/2006/relationships" xmlns:p="http://schemas.openxmlformats.org/presentationml/2006/main">
+  <p:cSld>
+    <p:spTree>
+      <p:nvGrpSpPr>
+        <p:cNvPr id="1" name=""/>
+        <p:cNvGrpSpPr/>
+        <p:nvPr/>
+      </p:nvGrpSpPr>
+      <p:grpSpPr>
+        <a:xfrm>
+          <a:off x="0" y="0"/>
+          <a:ext cx="0" cy="0"/>
+          <a:chOff x="0" y="0"/>
+          <a:chExt cx="0" cy="0"/>
+        </a:xfrm>
+      </p:grpSpPr>
+      <p:sp>
+        <p:nvSpPr>
+          <p:cNvPr id="2" name="Title 1"/>
+          <p:cNvSpPr>
+            <a:spLocks noGrp="1"/>
+          </p:cNvSpPr>
+          <p:nvPr>
+            <p:ph type="title"/>
+          </p:nvPr>
+        </p:nvSpPr>
+        <p:spPr/>
+        <p:txBody>
+          <a:bodyPr>
+            <a:normAutofit fontScale="90000"/>
+          </a:bodyPr>
+          <a:lstStyle/>
+          <a:p>
+            <a:r>
+              <a:rPr lang="en-US" sz="3800" dirty="0" smtClean="0"/>
+              <a:t>Steady-state economy: constant capital stock</a:t>
+            </a:r>
+            <a:endParaRPr lang="en-US" sz="3800" dirty="0"/>
+          </a:p>
+        </p:txBody>
+      </p:sp>
+      <p:sp>
+        <p:nvSpPr>
+          <p:cNvPr id="3" name="Content Placeholder 2"/>
+          <p:cNvSpPr>
+            <a:spLocks noGrp="1"/>
+          </p:cNvSpPr>
+          <p:nvPr>
+            <p:ph idx="1"/>
+          </p:nvPr>
+        </p:nvSpPr>
+        <p:spPr/>
+        <p:txBody>
+          <a:bodyPr>
+            <a:normAutofit lnSpcReduction="10000"/>
+          </a:bodyPr>
+          <a:lstStyle/>
+          <a:p>
+            <a:r>
+              <a:rPr lang="en-US" dirty="0" smtClean="0"/>
+              <a:t>Sustainability criteria:</a:t>
+            </a:r>
+          </a:p>
+          <a:p>
+            <a:pPr lvl="1"/>
+            <a:r>
+              <a:rPr lang="en-US" dirty="0" smtClean="0"/>
+              <a:t>depletion of natural capital must be below replenishment rates</a:t>
+            </a:r>
+          </a:p>
+          <a:p>
+            <a:r>
+              <a:rPr lang="en-US" dirty="0" smtClean="0"/>
+              <a:t>Harder to meet sustainability criteria with:</a:t>
+            </a:r>
+          </a:p>
+          <a:p>
+            <a:pPr lvl="1"/>
+            <a:r>
+              <a:rPr lang="en-US" dirty="0" smtClean="0"/>
+              <a:t>high short-lived goods flows (throwaway society)</a:t>
+            </a:r>
+          </a:p>
+          <a:p>
+            <a:pPr lvl="1"/>
+            <a:r>
+              <a:rPr lang="en-US" dirty="0" smtClean="0"/>
+              <a:t>high depreciation rates</a:t>
+            </a:r>
+          </a:p>
+          <a:p>
+            <a:pPr lvl="2"/>
+            <a:r>
+              <a:rPr lang="en-US" dirty="0" smtClean="0"/>
+              <a:t>more capital stock</a:t>
+            </a:r>
+          </a:p>
+          <a:p>
+            <a:pPr lvl="2"/>
+            <a:r>
+              <a:rPr lang="en-US" dirty="0" smtClean="0"/>
+              <a:t>short capital lifespan</a:t>
+            </a:r>
+            <a:endParaRPr lang="en-US" dirty="0"/>
+          </a:p>
+        </p:txBody>
+      </p:sp>
+    </p:spTree>
+    <p:extLst>
+      <p:ext uri="{BB962C8B-B14F-4D97-AF65-F5344CB8AC3E}">
+        <p14:creationId xmlns:p14="http://schemas.microsoft.com/office/powerpoint/2010/main" val="1032182335"/>
+      </p:ext>
+    </p:extLst>
+  </p:cSld>
+  <p:clrMapOvr>
+    <a:masterClrMapping/>
+  </p:clrMapOvr>
+</p:sld>
+</file>
+
+<file path=ppt/slides/slide24.xml><?xml version="1.0" encoding="utf-8"?>
+<p:sld xmlns:a="http://schemas.openxmlformats.org/drawingml/2006/main" xmlns:r="http://schemas.openxmlformats.org/officeDocument/2006/relationships" xmlns:p="http://schemas.openxmlformats.org/presentationml/2006/main">
+  <p:cSld>
+    <p:spTree>
+      <p:nvGrpSpPr>
+        <p:cNvPr id="1" name=""/>
+        <p:cNvGrpSpPr/>
+        <p:nvPr/>
+      </p:nvGrpSpPr>
+      <p:grpSpPr>
+        <a:xfrm>
+          <a:off x="0" y="0"/>
+          <a:ext cx="0" cy="0"/>
+          <a:chOff x="0" y="0"/>
+          <a:chExt cx="0" cy="0"/>
+        </a:xfrm>
+      </p:grpSpPr>
+      <p:sp>
+        <p:nvSpPr>
+          <p:cNvPr id="2" name="Title 1"/>
+          <p:cNvSpPr>
+            <a:spLocks noGrp="1"/>
+          </p:cNvSpPr>
+          <p:nvPr>
+            <p:ph type="title"/>
+          </p:nvPr>
+        </p:nvSpPr>
+        <p:spPr/>
+        <p:txBody>
+          <a:bodyPr>
+            <a:noAutofit/>
+          </a:bodyPr>
+          <a:lstStyle/>
+          <a:p>
+            <a:r>
+              <a:rPr lang="en-US" sz="3600" dirty="0" smtClean="0"/>
+              <a:t>Steady-state economy: constant material throughput</a:t>
+            </a:r>
+            <a:endParaRPr lang="en-US" sz="3600" dirty="0"/>
+          </a:p>
+        </p:txBody>
+      </p:sp>
+      <p:sp>
+        <p:nvSpPr>
+          <p:cNvPr id="3" name="Content Placeholder 2"/>
+          <p:cNvSpPr>
+            <a:spLocks noGrp="1"/>
+          </p:cNvSpPr>
+          <p:nvPr>
+            <p:ph idx="1"/>
+          </p:nvPr>
+        </p:nvSpPr>
+        <p:spPr/>
+        <p:txBody>
+          <a:bodyPr>
+            <a:normAutofit/>
+          </a:bodyPr>
+          <a:lstStyle/>
+          <a:p>
+            <a:r>
+              <a:rPr lang="en-US" dirty="0" smtClean="0"/>
+              <a:t>Sustainability criteria still applies</a:t>
+            </a:r>
+          </a:p>
+          <a:p>
+            <a:r>
+              <a:rPr lang="en-US" dirty="0" smtClean="0"/>
+              <a:t>Capital stock can increase if material and energy use becomes more efficient</a:t>
+            </a:r>
+          </a:p>
+          <a:p>
+            <a:r>
+              <a:rPr lang="en-US" dirty="0" smtClean="0"/>
+              <a:t>Need to maximize maintenance of capital stock per unit of material throughput</a:t>
+            </a:r>
+            <a:endParaRPr lang="en-US" dirty="0"/>
+          </a:p>
+        </p:txBody>
+      </p:sp>
+    </p:spTree>
+    <p:extLst>
+      <p:ext uri="{BB962C8B-B14F-4D97-AF65-F5344CB8AC3E}">
+        <p14:creationId xmlns:p14="http://schemas.microsoft.com/office/powerpoint/2010/main" val="1433616481"/>
+      </p:ext>
+    </p:extLst>
+  </p:cSld>
+  <p:clrMapOvr>
+    <a:masterClrMapping/>
+  </p:clrMapOvr>
+</p:sld>
+</file>
+
+<file path=ppt/slides/slide25.xml><?xml version="1.0" encoding="utf-8"?>
+<p:sld xmlns:a="http://schemas.openxmlformats.org/drawingml/2006/main" xmlns:r="http://schemas.openxmlformats.org/officeDocument/2006/relationships" xmlns:p="http://schemas.openxmlformats.org/presentationml/2006/main">
+  <p:cSld>
+    <p:spTree>
+      <p:nvGrpSpPr>
+        <p:cNvPr id="1" name=""/>
+        <p:cNvGrpSpPr/>
+        <p:nvPr/>
+      </p:nvGrpSpPr>
+      <p:grpSpPr>
+        <a:xfrm>
+          <a:off x="0" y="0"/>
+          <a:ext cx="0" cy="0"/>
+          <a:chOff x="0" y="0"/>
+          <a:chExt cx="0" cy="0"/>
+        </a:xfrm>
+      </p:grpSpPr>
+      <p:sp>
+        <p:nvSpPr>
+          <p:cNvPr id="2" name="Title 1"/>
+          <p:cNvSpPr>
+            <a:spLocks noGrp="1"/>
+          </p:cNvSpPr>
+          <p:nvPr>
+            <p:ph type="title"/>
+          </p:nvPr>
+        </p:nvSpPr>
+        <p:spPr/>
+        <p:txBody>
+          <a:bodyPr>
+            <a:noAutofit/>
+          </a:bodyPr>
+          <a:lstStyle/>
+          <a:p>
+            <a:r>
+              <a:rPr lang="en-US" sz="4000" dirty="0" smtClean="0"/>
+              <a:t>Steady-state economy: constant GDP</a:t>
+            </a:r>
+            <a:endParaRPr lang="en-US" sz="4000" dirty="0"/>
+          </a:p>
+        </p:txBody>
+      </p:sp>
+      <p:sp>
+        <p:nvSpPr>
+          <p:cNvPr id="3" name="Content Placeholder 2"/>
+          <p:cNvSpPr>
+            <a:spLocks noGrp="1"/>
+          </p:cNvSpPr>
+          <p:nvPr>
+            <p:ph idx="1"/>
+          </p:nvPr>
+        </p:nvSpPr>
+        <p:spPr/>
+        <p:txBody>
+          <a:bodyPr>
+            <a:normAutofit fontScale="85000" lnSpcReduction="20000"/>
+          </a:bodyPr>
+          <a:lstStyle/>
+          <a:p>
+            <a:r>
+              <a:rPr lang="en-US" dirty="0" smtClean="0"/>
+              <a:t>Constraining GDP may not achieve the desired restraint on material throughput</a:t>
+            </a:r>
+          </a:p>
+          <a:p>
+            <a:pPr lvl="1"/>
+            <a:r>
+              <a:rPr lang="en-US" dirty="0" smtClean="0"/>
+              <a:t>economy may become </a:t>
+            </a:r>
+            <a:r>
+              <a:rPr lang="en-US" smtClean="0"/>
+              <a:t>less efficient</a:t>
+            </a:r>
+            <a:endParaRPr lang="en-US" dirty="0" smtClean="0"/>
+          </a:p>
+          <a:p>
+            <a:r>
+              <a:rPr lang="en-US" dirty="0" smtClean="0"/>
+              <a:t>However, </a:t>
+            </a:r>
+            <a:r>
+              <a:rPr lang="en-US" dirty="0"/>
+              <a:t>increasing GDP may not produce </a:t>
+            </a:r>
+            <a:r>
+              <a:rPr lang="en-US" dirty="0" smtClean="0"/>
+              <a:t>desired </a:t>
+            </a:r>
+            <a:r>
+              <a:rPr lang="en-US" dirty="0"/>
+              <a:t>increase in material </a:t>
+            </a:r>
+            <a:r>
+              <a:rPr lang="en-US" dirty="0" smtClean="0"/>
+              <a:t>wellbeing</a:t>
+            </a:r>
+          </a:p>
+          <a:p>
+            <a:pPr lvl="1"/>
+            <a:r>
+              <a:rPr lang="en-US" dirty="0"/>
+              <a:t>c</a:t>
+            </a:r>
+            <a:r>
+              <a:rPr lang="en-US" dirty="0" smtClean="0"/>
+              <a:t>osts (e.g., externalities and defensive expenditures) outweigh any benefits that comes from increasing GDP (‘uneconomic growth’)</a:t>
+            </a:r>
+          </a:p>
+          <a:p>
+            <a:pPr lvl="1"/>
+            <a:r>
+              <a:rPr lang="en-US" dirty="0" smtClean="0"/>
+              <a:t>increasing </a:t>
+            </a:r>
+            <a:r>
+              <a:rPr lang="en-US" dirty="0"/>
+              <a:t>GDP increases </a:t>
+            </a:r>
+            <a:r>
+              <a:rPr lang="en-US" i="1" dirty="0"/>
+              <a:t>relative</a:t>
+            </a:r>
+            <a:r>
+              <a:rPr lang="en-US" dirty="0"/>
+              <a:t> income inequality, which </a:t>
+            </a:r>
+            <a:r>
+              <a:rPr lang="en-US" dirty="0" smtClean="0"/>
+              <a:t>decreases welfare </a:t>
+            </a:r>
+            <a:r>
+              <a:rPr lang="en-US" dirty="0"/>
+              <a:t>for both rich and poor alike</a:t>
+            </a:r>
+            <a:endParaRPr lang="en-US" dirty="0" smtClean="0"/>
+          </a:p>
+          <a:p>
+            <a:pPr lvl="1"/>
+            <a:endParaRPr lang="en-US" dirty="0"/>
+          </a:p>
+        </p:txBody>
+      </p:sp>
+    </p:spTree>
+    <p:extLst>
+      <p:ext uri="{BB962C8B-B14F-4D97-AF65-F5344CB8AC3E}">
+        <p14:creationId xmlns:p14="http://schemas.microsoft.com/office/powerpoint/2010/main" val="234105323"/>
+      </p:ext>
+    </p:extLst>
+  </p:cSld>
+  <p:clrMapOvr>
+    <a:masterClrMapping/>
+  </p:clrMapOvr>
+</p:sld>
+</file>
+
+<file path=ppt/slides/slide26.xml><?xml version="1.0" encoding="utf-8"?>
+<p:sld xmlns:a="http://schemas.openxmlformats.org/drawingml/2006/main" xmlns:r="http://schemas.openxmlformats.org/officeDocument/2006/relationships" xmlns:p="http://schemas.openxmlformats.org/presentationml/2006/main">
+  <p:cSld>
+    <p:spTree>
+      <p:nvGrpSpPr>
+        <p:cNvPr id="1" name=""/>
+        <p:cNvGrpSpPr/>
+        <p:nvPr/>
+      </p:nvGrpSpPr>
+      <p:grpSpPr>
+        <a:xfrm>
+          <a:off x="0" y="0"/>
+          <a:ext cx="0" cy="0"/>
+          <a:chOff x="0" y="0"/>
+          <a:chExt cx="0" cy="0"/>
+        </a:xfrm>
+      </p:grpSpPr>
+      <p:sp>
+        <p:nvSpPr>
+          <p:cNvPr id="2" name="Title 1"/>
+          <p:cNvSpPr>
+            <a:spLocks noGrp="1"/>
+          </p:cNvSpPr>
+          <p:nvPr>
+            <p:ph type="title"/>
+          </p:nvPr>
+        </p:nvSpPr>
+        <p:spPr/>
+        <p:txBody>
           <a:bodyPr/>
           <a:lstStyle/>
           <a:p>
@@ -4359,7 +5225,7 @@
 </p:sld>
 </file>
 
-<file path=ppt/slides/slide21.xml><?xml version="1.0" encoding="utf-8"?>
+<file path=ppt/slides/slide27.xml><?xml version="1.0" encoding="utf-8"?>
 <p:sld xmlns:a="http://schemas.openxmlformats.org/drawingml/2006/main" xmlns:r="http://schemas.openxmlformats.org/officeDocument/2006/relationships" xmlns:p="http://schemas.openxmlformats.org/presentationml/2006/main">
   <p:cSld>
     <p:spTree>

</xml_diff>